<commit_message>
modify poster 5 (finish?)
</commit_message>
<xml_diff>
--- a/Poster_Pimpmyfridge.pptx
+++ b/Poster_Pimpmyfridge.pptx
@@ -748,7 +748,7 @@
           </a:bodyPr>
           <a:lstStyle/>
           <a:p>
-            <a:endParaRPr lang="en-US"/>
+            <a:endParaRPr lang="en-US" dirty="0"/>
           </a:p>
         </p:txBody>
       </p:sp>
@@ -4450,7 +4450,7 @@
               <a:graphicData uri="http://schemas.openxmlformats.org/presentationml/2006/ole">
                 <mc:AlternateContent xmlns:mc="http://schemas.openxmlformats.org/markup-compatibility/2006">
                   <mc:Choice xmlns:v="urn:schemas-microsoft-com:vml" Requires="v">
-                    <p:oleObj spid="_x0000_s2234" name="Image" r:id="rId8" imgW="1828440" imgH="1117440" progId="Photoshop.Image.13">
+                    <p:oleObj spid="_x0000_s2246" name="Image" r:id="rId8" imgW="1828440" imgH="1117440" progId="Photoshop.Image.13">
                       <p:embed/>
                     </p:oleObj>
                   </mc:Choice>
@@ -4507,7 +4507,7 @@
               <a:graphicData uri="http://schemas.openxmlformats.org/presentationml/2006/ole">
                 <mc:AlternateContent xmlns:mc="http://schemas.openxmlformats.org/markup-compatibility/2006">
                   <mc:Choice xmlns:v="urn:schemas-microsoft-com:vml" Requires="v">
-                    <p:oleObj spid="_x0000_s2235" name="Image" r:id="rId10" imgW="1828440" imgH="1117440" progId="Photoshop.Image.13">
+                    <p:oleObj spid="_x0000_s2247" name="Image" r:id="rId10" imgW="1828440" imgH="1117440" progId="Photoshop.Image.13">
                       <p:embed/>
                     </p:oleObj>
                   </mc:Choice>
@@ -5642,7 +5642,7 @@
             <a:graphicData uri="http://schemas.openxmlformats.org/presentationml/2006/ole">
               <mc:AlternateContent xmlns:mc="http://schemas.openxmlformats.org/markup-compatibility/2006">
                 <mc:Choice xmlns:v="urn:schemas-microsoft-com:vml" Requires="v">
-                  <p:oleObj spid="_x0000_s2236" name="Image" r:id="rId12" imgW="4571280" imgH="1688760" progId="Photoshop.Image.13">
+                  <p:oleObj spid="_x0000_s2248" name="Image" r:id="rId12" imgW="4571280" imgH="1688760" progId="Photoshop.Image.13">
                     <p:embed/>
                   </p:oleObj>
                 </mc:Choice>
@@ -5726,7 +5726,7 @@
             <a:graphicData uri="http://schemas.openxmlformats.org/presentationml/2006/ole">
               <mc:AlternateContent xmlns:mc="http://schemas.openxmlformats.org/markup-compatibility/2006">
                 <mc:Choice xmlns:v="urn:schemas-microsoft-com:vml" Requires="v">
-                  <p:oleObj spid="_x0000_s2237" name="Image" r:id="rId15" imgW="1574280" imgH="1053720" progId="Photoshop.Image.13">
+                  <p:oleObj spid="_x0000_s2249" name="Image" r:id="rId15" imgW="1574280" imgH="1053720" progId="Photoshop.Image.13">
                     <p:embed/>
                   </p:oleObj>
                 </mc:Choice>
@@ -6619,29 +6619,38 @@
         <p:spPr>
           <a:xfrm>
             <a:off x="21691217" y="23413166"/>
-            <a:ext cx="20194689" cy="4625320"/>
+            <a:ext cx="20194689" cy="4675142"/>
           </a:xfrm>
         </p:spPr>
         <p:txBody>
-          <a:bodyPr numCol="2"/>
+          <a:bodyPr numCol="1"/>
           <a:lstStyle/>
           <a:p>
-            <a:pPr marL="571500" indent="-571500">
-              <a:buFontTx/>
-              <a:buChar char="-"/>
-            </a:pPr>
             <a:r>
               <a:rPr lang="fr-FR" sz="4000" dirty="0">
                 <a:latin typeface="+mn-lt"/>
               </a:rPr>
-              <a:t>Acquisition de connaissances (et rappel de connaissances)</a:t>
-            </a:r>
-          </a:p>
-          <a:p>
-            <a:pPr marL="2628849" lvl="1" indent="-571500">
-              <a:buFontTx/>
-              <a:buChar char="-"/>
-            </a:pPr>
+              <a:t>Acquisition de connaissances (et rappel de connaissances):</a:t>
+            </a:r>
+            <a:endParaRPr lang="fr-FR" sz="4000" dirty="0">
+              <a:solidFill>
+                <a:schemeClr val="tx1"/>
+              </a:solidFill>
+              <a:latin typeface="+mn-lt"/>
+              <a:cs typeface="+mn-cs"/>
+            </a:endParaRPr>
+          </a:p>
+          <a:p>
+            <a:r>
+              <a:rPr lang="fr-FR" sz="4000" dirty="0">
+                <a:solidFill>
+                  <a:schemeClr val="tx1"/>
+                </a:solidFill>
+                <a:latin typeface="+mn-lt"/>
+                <a:cs typeface="+mn-cs"/>
+              </a:rPr>
+              <a:t>- </a:t>
+            </a:r>
             <a:r>
               <a:rPr lang="fr-FR" sz="4000" dirty="0">
                 <a:solidFill>
@@ -6656,10 +6665,6 @@
             </a:r>
           </a:p>
           <a:p>
-            <a:pPr marL="2628849" lvl="1" indent="-571500">
-              <a:buFontTx/>
-              <a:buChar char="-"/>
-            </a:pPr>
             <a:r>
               <a:rPr lang="fr-FR" sz="4000" dirty="0">
                 <a:solidFill>
@@ -6670,7 +6675,7 @@
                 <a:latin typeface="+mj-lt"/>
                 <a:cs typeface="Times New Roman" panose="02020603050405020304" pitchFamily="18" charset="0"/>
               </a:rPr>
-              <a:t>Mesure physique (</a:t>
+              <a:t>- Mesure physique (</a:t>
             </a:r>
             <a:r>
               <a:rPr lang="fr-FR" sz="4000" dirty="0" err="1">
@@ -6698,10 +6703,6 @@
             </a:r>
           </a:p>
           <a:p>
-            <a:pPr marL="2628849" lvl="1" indent="-571500">
-              <a:buFontTx/>
-              <a:buChar char="-"/>
-            </a:pPr>
             <a:r>
               <a:rPr lang="fr-FR" sz="4000" dirty="0">
                 <a:solidFill>
@@ -6712,16 +6713,15 @@
                 <a:latin typeface="+mj-lt"/>
                 <a:cs typeface="Times New Roman" panose="02020603050405020304" pitchFamily="18" charset="0"/>
               </a:rPr>
-              <a:t>Électronique</a:t>
-            </a:r>
-          </a:p>
-          <a:p>
-            <a:pPr marL="2628849" lvl="1" indent="-571500">
-              <a:buFontTx/>
-              <a:buChar char="-"/>
-            </a:pPr>
-            <a:r>
-              <a:rPr lang="fr-FR" sz="4000" dirty="0">
+              <a:t>- Électronique</a:t>
+            </a:r>
+            <a:endParaRPr lang="fr-FR" sz="4000" dirty="0">
+              <a:latin typeface="+mj-lt"/>
+            </a:endParaRPr>
+          </a:p>
+          <a:p>
+            <a:r>
+              <a:rPr lang="fr-FR" sz="4000">
                 <a:solidFill>
                   <a:schemeClr val="accent5">
                     <a:lumMod val="50000"/>
@@ -6730,7 +6730,19 @@
                 <a:latin typeface="+mj-lt"/>
                 <a:cs typeface="Times New Roman" panose="02020603050405020304" pitchFamily="18" charset="0"/>
               </a:rPr>
-              <a:t>Java (interface)</a:t>
+              <a:t>- Java </a:t>
+            </a:r>
+            <a:r>
+              <a:rPr lang="fr-FR" sz="4000" dirty="0">
+                <a:solidFill>
+                  <a:schemeClr val="accent5">
+                    <a:lumMod val="50000"/>
+                  </a:schemeClr>
+                </a:solidFill>
+                <a:latin typeface="+mj-lt"/>
+                <a:cs typeface="Times New Roman" panose="02020603050405020304" pitchFamily="18" charset="0"/>
+              </a:rPr>
+              <a:t>(interface)</a:t>
             </a:r>
           </a:p>
           <a:p>

</xml_diff>